<commit_message>
Added examples for Reorientate
</commit_message>
<xml_diff>
--- a/doc/Examples-PositionsLab.pptx
+++ b/doc/Examples-PositionsLab.pptx
@@ -19,16 +19,18 @@
     <p:sldId id="268" r:id="rId13"/>
     <p:sldId id="271" r:id="rId14"/>
     <p:sldId id="270" r:id="rId15"/>
+    <p:sldId id="273" r:id="rId16"/>
+    <p:sldId id="272" r:id="rId17"/>
   </p:sldIdLst>
   <p:sldSz cx="9144000" cy="6858000" type="screen4x3"/>
   <p:notesSz cx="6858000" cy="9144000"/>
   <p:embeddedFontLst>
     <p:embeddedFont>
       <p:font typeface="Calibri" panose="020F0502020204030204" pitchFamily="34" charset="0"/>
-      <p:regular r:id="rId16"/>
-      <p:bold r:id="rId17"/>
-      <p:italic r:id="rId18"/>
-      <p:boldItalic r:id="rId19"/>
+      <p:regular r:id="rId18"/>
+      <p:bold r:id="rId19"/>
+      <p:italic r:id="rId20"/>
+      <p:boldItalic r:id="rId21"/>
     </p:embeddedFont>
   </p:embeddedFontLst>
   <p:defaultTextStyle>
@@ -164,7 +166,10 @@
           </p14:sldIdLst>
         </p14:section>
         <p14:section name="Reorientate Examples" id="{4A482D7B-9B3A-4FF0-8688-EA99AC276334}">
-          <p14:sldIdLst/>
+          <p14:sldIdLst>
+            <p14:sldId id="273"/>
+            <p14:sldId id="272"/>
+          </p14:sldIdLst>
         </p14:section>
       </p14:sectionLst>
     </p:ext>
@@ -6457,6 +6462,937 @@
 </p:sld>
 </file>
 
+<file path=ppt/slides/slide15.xml><?xml version="1.0" encoding="utf-8"?>
+<p:sld xmlns:a="http://schemas.openxmlformats.org/drawingml/2006/main" xmlns:r="http://schemas.openxmlformats.org/officeDocument/2006/relationships" xmlns:p="http://schemas.openxmlformats.org/presentationml/2006/main">
+  <p:cSld>
+    <p:spTree>
+      <p:nvGrpSpPr>
+        <p:cNvPr id="1" name=""/>
+        <p:cNvGrpSpPr/>
+        <p:nvPr/>
+      </p:nvGrpSpPr>
+      <p:grpSpPr>
+        <a:xfrm>
+          <a:off x="0" y="0"/>
+          <a:ext cx="0" cy="0"/>
+          <a:chOff x="0" y="0"/>
+          <a:chExt cx="0" cy="0"/>
+        </a:xfrm>
+      </p:grpSpPr>
+      <p:pic>
+        <p:nvPicPr>
+          <p:cNvPr id="17" name="Picture 16"/>
+          <p:cNvPicPr>
+            <a:picLocks noChangeAspect="1"/>
+          </p:cNvPicPr>
+          <p:nvPr/>
+        </p:nvPicPr>
+        <p:blipFill>
+          <a:blip r:embed="rId2">
+            <a:extLst>
+              <a:ext uri="{28A0092B-C50C-407E-A947-70E740481C1C}">
+                <a14:useLocalDpi xmlns:a14="http://schemas.microsoft.com/office/drawing/2010/main" val="0"/>
+              </a:ext>
+            </a:extLst>
+          </a:blip>
+          <a:stretch>
+            <a:fillRect/>
+          </a:stretch>
+        </p:blipFill>
+        <p:spPr>
+          <a:xfrm>
+            <a:off x="4092742" y="3250011"/>
+            <a:ext cx="590550" cy="752475"/>
+          </a:xfrm>
+          <a:prstGeom prst="rect">
+            <a:avLst/>
+          </a:prstGeom>
+        </p:spPr>
+      </p:pic>
+      <p:sp>
+        <p:nvSpPr>
+          <p:cNvPr id="2" name="Right Arrow 1"/>
+          <p:cNvSpPr/>
+          <p:nvPr/>
+        </p:nvSpPr>
+        <p:spPr>
+          <a:xfrm rot="20004389">
+            <a:off x="1985531" y="2131270"/>
+            <a:ext cx="1371600" cy="304800"/>
+          </a:xfrm>
+          <a:prstGeom prst="rightArrow">
+            <a:avLst/>
+          </a:prstGeom>
+        </p:spPr>
+        <p:style>
+          <a:lnRef idx="2">
+            <a:schemeClr val="accent1">
+              <a:shade val="50000"/>
+            </a:schemeClr>
+          </a:lnRef>
+          <a:fillRef idx="1">
+            <a:schemeClr val="accent1"/>
+          </a:fillRef>
+          <a:effectRef idx="0">
+            <a:schemeClr val="accent1"/>
+          </a:effectRef>
+          <a:fontRef idx="minor">
+            <a:schemeClr val="lt1"/>
+          </a:fontRef>
+        </p:style>
+        <p:txBody>
+          <a:bodyPr rtlCol="0" anchor="ctr"/>
+          <a:lstStyle/>
+          <a:p>
+            <a:pPr algn="ctr"/>
+            <a:endParaRPr lang="en-US"/>
+          </a:p>
+        </p:txBody>
+      </p:sp>
+      <p:sp>
+        <p:nvSpPr>
+          <p:cNvPr id="3" name="Right Arrow 2"/>
+          <p:cNvSpPr/>
+          <p:nvPr/>
+        </p:nvSpPr>
+        <p:spPr>
+          <a:xfrm rot="1946213">
+            <a:off x="1930253" y="3770734"/>
+            <a:ext cx="1371600" cy="304800"/>
+          </a:xfrm>
+          <a:prstGeom prst="rightArrow">
+            <a:avLst/>
+          </a:prstGeom>
+        </p:spPr>
+        <p:style>
+          <a:lnRef idx="2">
+            <a:schemeClr val="accent1">
+              <a:shade val="50000"/>
+            </a:schemeClr>
+          </a:lnRef>
+          <a:fillRef idx="1">
+            <a:schemeClr val="accent1"/>
+          </a:fillRef>
+          <a:effectRef idx="0">
+            <a:schemeClr val="accent1"/>
+          </a:effectRef>
+          <a:fontRef idx="minor">
+            <a:schemeClr val="lt1"/>
+          </a:fontRef>
+        </p:style>
+        <p:txBody>
+          <a:bodyPr rtlCol="0" anchor="ctr"/>
+          <a:lstStyle/>
+          <a:p>
+            <a:pPr algn="ctr"/>
+            <a:endParaRPr lang="en-US"/>
+          </a:p>
+        </p:txBody>
+      </p:sp>
+      <p:sp>
+        <p:nvSpPr>
+          <p:cNvPr id="4" name="Right Arrow 3"/>
+          <p:cNvSpPr/>
+          <p:nvPr/>
+        </p:nvSpPr>
+        <p:spPr>
+          <a:xfrm>
+            <a:off x="2057400" y="2940449"/>
+            <a:ext cx="1371600" cy="304800"/>
+          </a:xfrm>
+          <a:prstGeom prst="rightArrow">
+            <a:avLst/>
+          </a:prstGeom>
+        </p:spPr>
+        <p:style>
+          <a:lnRef idx="2">
+            <a:schemeClr val="accent1">
+              <a:shade val="50000"/>
+            </a:schemeClr>
+          </a:lnRef>
+          <a:fillRef idx="1">
+            <a:schemeClr val="accent1"/>
+          </a:fillRef>
+          <a:effectRef idx="0">
+            <a:schemeClr val="accent1"/>
+          </a:effectRef>
+          <a:fontRef idx="minor">
+            <a:schemeClr val="lt1"/>
+          </a:fontRef>
+        </p:style>
+        <p:txBody>
+          <a:bodyPr rtlCol="0" anchor="ctr"/>
+          <a:lstStyle/>
+          <a:p>
+            <a:pPr algn="ctr"/>
+            <a:endParaRPr lang="en-US"/>
+          </a:p>
+        </p:txBody>
+      </p:sp>
+      <p:sp>
+        <p:nvSpPr>
+          <p:cNvPr id="5" name="Oval 4"/>
+          <p:cNvSpPr/>
+          <p:nvPr/>
+        </p:nvSpPr>
+        <p:spPr>
+          <a:xfrm>
+            <a:off x="685800" y="2559449"/>
+            <a:ext cx="1066800" cy="1066800"/>
+          </a:xfrm>
+          <a:prstGeom prst="ellipse">
+            <a:avLst/>
+          </a:prstGeom>
+        </p:spPr>
+        <p:style>
+          <a:lnRef idx="2">
+            <a:schemeClr val="accent1">
+              <a:shade val="50000"/>
+            </a:schemeClr>
+          </a:lnRef>
+          <a:fillRef idx="1">
+            <a:schemeClr val="accent1"/>
+          </a:fillRef>
+          <a:effectRef idx="0">
+            <a:schemeClr val="accent1"/>
+          </a:effectRef>
+          <a:fontRef idx="minor">
+            <a:schemeClr val="lt1"/>
+          </a:fontRef>
+        </p:style>
+        <p:txBody>
+          <a:bodyPr rtlCol="0" anchor="ctr"/>
+          <a:lstStyle/>
+          <a:p>
+            <a:pPr algn="ctr"/>
+            <a:endParaRPr lang="en-US"/>
+          </a:p>
+        </p:txBody>
+      </p:sp>
+      <p:sp>
+        <p:nvSpPr>
+          <p:cNvPr id="6" name="Down Arrow 62"/>
+          <p:cNvSpPr/>
+          <p:nvPr/>
+        </p:nvSpPr>
+        <p:spPr>
+          <a:xfrm rot="16200000">
+            <a:off x="4229100" y="2436068"/>
+            <a:ext cx="685800" cy="1295400"/>
+          </a:xfrm>
+          <a:prstGeom prst="downArrow">
+            <a:avLst/>
+          </a:prstGeom>
+          <a:solidFill>
+            <a:srgbClr val="A34742"/>
+          </a:solidFill>
+          <a:ln>
+            <a:noFill/>
+          </a:ln>
+        </p:spPr>
+        <p:style>
+          <a:lnRef idx="2">
+            <a:schemeClr val="accent1">
+              <a:shade val="50000"/>
+            </a:schemeClr>
+          </a:lnRef>
+          <a:fillRef idx="1">
+            <a:schemeClr val="accent1"/>
+          </a:fillRef>
+          <a:effectRef idx="0">
+            <a:schemeClr val="accent1"/>
+          </a:effectRef>
+          <a:fontRef idx="minor">
+            <a:schemeClr val="lt1"/>
+          </a:fontRef>
+        </p:style>
+        <p:txBody>
+          <a:bodyPr rtlCol="0" anchor="ctr"/>
+          <a:lstStyle/>
+          <a:p>
+            <a:pPr algn="ctr"/>
+            <a:endParaRPr lang="en-US"/>
+          </a:p>
+        </p:txBody>
+      </p:sp>
+      <p:sp>
+        <p:nvSpPr>
+          <p:cNvPr id="7" name="Right Arrow 6"/>
+          <p:cNvSpPr/>
+          <p:nvPr/>
+        </p:nvSpPr>
+        <p:spPr>
+          <a:xfrm>
+            <a:off x="7239000" y="2131270"/>
+            <a:ext cx="1371600" cy="304800"/>
+          </a:xfrm>
+          <a:prstGeom prst="rightArrow">
+            <a:avLst/>
+          </a:prstGeom>
+        </p:spPr>
+        <p:style>
+          <a:lnRef idx="2">
+            <a:schemeClr val="accent1">
+              <a:shade val="50000"/>
+            </a:schemeClr>
+          </a:lnRef>
+          <a:fillRef idx="1">
+            <a:schemeClr val="accent1"/>
+          </a:fillRef>
+          <a:effectRef idx="0">
+            <a:schemeClr val="accent1"/>
+          </a:effectRef>
+          <a:fontRef idx="minor">
+            <a:schemeClr val="lt1"/>
+          </a:fontRef>
+        </p:style>
+        <p:txBody>
+          <a:bodyPr rtlCol="0" anchor="ctr"/>
+          <a:lstStyle/>
+          <a:p>
+            <a:pPr algn="ctr"/>
+            <a:endParaRPr lang="en-US"/>
+          </a:p>
+        </p:txBody>
+      </p:sp>
+      <p:sp>
+        <p:nvSpPr>
+          <p:cNvPr id="8" name="Right Arrow 7"/>
+          <p:cNvSpPr/>
+          <p:nvPr/>
+        </p:nvSpPr>
+        <p:spPr>
+          <a:xfrm>
+            <a:off x="7239000" y="3770734"/>
+            <a:ext cx="1371600" cy="304800"/>
+          </a:xfrm>
+          <a:prstGeom prst="rightArrow">
+            <a:avLst/>
+          </a:prstGeom>
+        </p:spPr>
+        <p:style>
+          <a:lnRef idx="2">
+            <a:schemeClr val="accent1">
+              <a:shade val="50000"/>
+            </a:schemeClr>
+          </a:lnRef>
+          <a:fillRef idx="1">
+            <a:schemeClr val="accent1"/>
+          </a:fillRef>
+          <a:effectRef idx="0">
+            <a:schemeClr val="accent1"/>
+          </a:effectRef>
+          <a:fontRef idx="minor">
+            <a:schemeClr val="lt1"/>
+          </a:fontRef>
+        </p:style>
+        <p:txBody>
+          <a:bodyPr rtlCol="0" anchor="ctr"/>
+          <a:lstStyle/>
+          <a:p>
+            <a:pPr algn="ctr"/>
+            <a:endParaRPr lang="en-US"/>
+          </a:p>
+        </p:txBody>
+      </p:sp>
+      <p:sp>
+        <p:nvSpPr>
+          <p:cNvPr id="9" name="Right Arrow 8"/>
+          <p:cNvSpPr/>
+          <p:nvPr/>
+        </p:nvSpPr>
+        <p:spPr>
+          <a:xfrm>
+            <a:off x="7277100" y="2940449"/>
+            <a:ext cx="1371600" cy="304800"/>
+          </a:xfrm>
+          <a:prstGeom prst="rightArrow">
+            <a:avLst/>
+          </a:prstGeom>
+        </p:spPr>
+        <p:style>
+          <a:lnRef idx="2">
+            <a:schemeClr val="accent1">
+              <a:shade val="50000"/>
+            </a:schemeClr>
+          </a:lnRef>
+          <a:fillRef idx="1">
+            <a:schemeClr val="accent1"/>
+          </a:fillRef>
+          <a:effectRef idx="0">
+            <a:schemeClr val="accent1"/>
+          </a:effectRef>
+          <a:fontRef idx="minor">
+            <a:schemeClr val="lt1"/>
+          </a:fontRef>
+        </p:style>
+        <p:txBody>
+          <a:bodyPr rtlCol="0" anchor="ctr"/>
+          <a:lstStyle/>
+          <a:p>
+            <a:pPr algn="ctr"/>
+            <a:endParaRPr lang="en-US"/>
+          </a:p>
+        </p:txBody>
+      </p:sp>
+      <p:sp>
+        <p:nvSpPr>
+          <p:cNvPr id="10" name="Oval 9"/>
+          <p:cNvSpPr/>
+          <p:nvPr/>
+        </p:nvSpPr>
+        <p:spPr>
+          <a:xfrm>
+            <a:off x="5943600" y="2559449"/>
+            <a:ext cx="1066800" cy="1066800"/>
+          </a:xfrm>
+          <a:prstGeom prst="ellipse">
+            <a:avLst/>
+          </a:prstGeom>
+        </p:spPr>
+        <p:style>
+          <a:lnRef idx="2">
+            <a:schemeClr val="accent1">
+              <a:shade val="50000"/>
+            </a:schemeClr>
+          </a:lnRef>
+          <a:fillRef idx="1">
+            <a:schemeClr val="accent1"/>
+          </a:fillRef>
+          <a:effectRef idx="0">
+            <a:schemeClr val="accent1"/>
+          </a:effectRef>
+          <a:fontRef idx="minor">
+            <a:schemeClr val="lt1"/>
+          </a:fontRef>
+        </p:style>
+        <p:txBody>
+          <a:bodyPr rtlCol="0" anchor="ctr"/>
+          <a:lstStyle/>
+          <a:p>
+            <a:pPr algn="ctr"/>
+            <a:endParaRPr lang="en-US"/>
+          </a:p>
+        </p:txBody>
+      </p:sp>
+    </p:spTree>
+    <p:extLst>
+      <p:ext uri="{BB962C8B-B14F-4D97-AF65-F5344CB8AC3E}">
+        <p14:creationId xmlns:p14="http://schemas.microsoft.com/office/powerpoint/2010/main" val="2899051110"/>
+      </p:ext>
+    </p:extLst>
+  </p:cSld>
+  <p:clrMapOvr>
+    <a:masterClrMapping/>
+  </p:clrMapOvr>
+</p:sld>
+</file>
+
+<file path=ppt/slides/slide16.xml><?xml version="1.0" encoding="utf-8"?>
+<p:sld xmlns:a="http://schemas.openxmlformats.org/drawingml/2006/main" xmlns:r="http://schemas.openxmlformats.org/officeDocument/2006/relationships" xmlns:p="http://schemas.openxmlformats.org/presentationml/2006/main">
+  <p:cSld>
+    <p:spTree>
+      <p:nvGrpSpPr>
+        <p:cNvPr id="1" name=""/>
+        <p:cNvGrpSpPr/>
+        <p:nvPr/>
+      </p:nvGrpSpPr>
+      <p:grpSpPr>
+        <a:xfrm>
+          <a:off x="0" y="0"/>
+          <a:ext cx="0" cy="0"/>
+          <a:chOff x="0" y="0"/>
+          <a:chExt cx="0" cy="0"/>
+        </a:xfrm>
+      </p:grpSpPr>
+      <p:sp>
+        <p:nvSpPr>
+          <p:cNvPr id="2" name="Oval 1"/>
+          <p:cNvSpPr/>
+          <p:nvPr/>
+        </p:nvSpPr>
+        <p:spPr>
+          <a:xfrm>
+            <a:off x="1280634" y="2740246"/>
+            <a:ext cx="1185333" cy="1185333"/>
+          </a:xfrm>
+          <a:prstGeom prst="ellipse">
+            <a:avLst/>
+          </a:prstGeom>
+        </p:spPr>
+        <p:style>
+          <a:lnRef idx="2">
+            <a:schemeClr val="accent1">
+              <a:shade val="50000"/>
+            </a:schemeClr>
+          </a:lnRef>
+          <a:fillRef idx="1">
+            <a:schemeClr val="accent1"/>
+          </a:fillRef>
+          <a:effectRef idx="0">
+            <a:schemeClr val="accent1"/>
+          </a:effectRef>
+          <a:fontRef idx="minor">
+            <a:schemeClr val="lt1"/>
+          </a:fontRef>
+        </p:style>
+        <p:txBody>
+          <a:bodyPr rtlCol="0" anchor="ctr"/>
+          <a:lstStyle/>
+          <a:p>
+            <a:pPr algn="ctr"/>
+            <a:endParaRPr lang="en-US"/>
+          </a:p>
+        </p:txBody>
+      </p:sp>
+      <p:sp>
+        <p:nvSpPr>
+          <p:cNvPr id="3" name="Right Arrow 2"/>
+          <p:cNvSpPr/>
+          <p:nvPr/>
+        </p:nvSpPr>
+        <p:spPr>
+          <a:xfrm>
+            <a:off x="1428800" y="2030325"/>
+            <a:ext cx="889000" cy="444500"/>
+          </a:xfrm>
+          <a:prstGeom prst="rightArrow">
+            <a:avLst/>
+          </a:prstGeom>
+        </p:spPr>
+        <p:style>
+          <a:lnRef idx="2">
+            <a:schemeClr val="accent1">
+              <a:shade val="50000"/>
+            </a:schemeClr>
+          </a:lnRef>
+          <a:fillRef idx="1">
+            <a:schemeClr val="accent1"/>
+          </a:fillRef>
+          <a:effectRef idx="0">
+            <a:schemeClr val="accent1"/>
+          </a:effectRef>
+          <a:fontRef idx="minor">
+            <a:schemeClr val="lt1"/>
+          </a:fontRef>
+        </p:style>
+        <p:txBody>
+          <a:bodyPr rtlCol="0" anchor="ctr"/>
+          <a:lstStyle/>
+          <a:p>
+            <a:pPr algn="ctr"/>
+            <a:endParaRPr lang="en-US"/>
+          </a:p>
+        </p:txBody>
+      </p:sp>
+      <p:sp>
+        <p:nvSpPr>
+          <p:cNvPr id="4" name="Right Arrow 3"/>
+          <p:cNvSpPr/>
+          <p:nvPr/>
+        </p:nvSpPr>
+        <p:spPr>
+          <a:xfrm>
+            <a:off x="2705201" y="3209260"/>
+            <a:ext cx="889000" cy="444500"/>
+          </a:xfrm>
+          <a:prstGeom prst="rightArrow">
+            <a:avLst/>
+          </a:prstGeom>
+        </p:spPr>
+        <p:style>
+          <a:lnRef idx="2">
+            <a:schemeClr val="accent1">
+              <a:shade val="50000"/>
+            </a:schemeClr>
+          </a:lnRef>
+          <a:fillRef idx="1">
+            <a:schemeClr val="accent1"/>
+          </a:fillRef>
+          <a:effectRef idx="0">
+            <a:schemeClr val="accent1"/>
+          </a:effectRef>
+          <a:fontRef idx="minor">
+            <a:schemeClr val="lt1"/>
+          </a:fontRef>
+        </p:style>
+        <p:txBody>
+          <a:bodyPr rtlCol="0" anchor="ctr"/>
+          <a:lstStyle/>
+          <a:p>
+            <a:pPr algn="ctr"/>
+            <a:endParaRPr lang="en-US"/>
+          </a:p>
+        </p:txBody>
+      </p:sp>
+      <p:sp>
+        <p:nvSpPr>
+          <p:cNvPr id="5" name="Right Arrow 4"/>
+          <p:cNvSpPr/>
+          <p:nvPr/>
+        </p:nvSpPr>
+        <p:spPr>
+          <a:xfrm>
+            <a:off x="1428800" y="4191000"/>
+            <a:ext cx="889000" cy="444500"/>
+          </a:xfrm>
+          <a:prstGeom prst="rightArrow">
+            <a:avLst/>
+          </a:prstGeom>
+        </p:spPr>
+        <p:style>
+          <a:lnRef idx="2">
+            <a:schemeClr val="accent1">
+              <a:shade val="50000"/>
+            </a:schemeClr>
+          </a:lnRef>
+          <a:fillRef idx="1">
+            <a:schemeClr val="accent1"/>
+          </a:fillRef>
+          <a:effectRef idx="0">
+            <a:schemeClr val="accent1"/>
+          </a:effectRef>
+          <a:fontRef idx="minor">
+            <a:schemeClr val="lt1"/>
+          </a:fontRef>
+        </p:style>
+        <p:txBody>
+          <a:bodyPr rtlCol="0" anchor="ctr"/>
+          <a:lstStyle/>
+          <a:p>
+            <a:pPr algn="ctr"/>
+            <a:endParaRPr lang="en-US"/>
+          </a:p>
+        </p:txBody>
+      </p:sp>
+      <p:sp>
+        <p:nvSpPr>
+          <p:cNvPr id="6" name="Right Arrow 5"/>
+          <p:cNvSpPr/>
+          <p:nvPr/>
+        </p:nvSpPr>
+        <p:spPr>
+          <a:xfrm>
+            <a:off x="152400" y="3209260"/>
+            <a:ext cx="889000" cy="444500"/>
+          </a:xfrm>
+          <a:prstGeom prst="rightArrow">
+            <a:avLst/>
+          </a:prstGeom>
+        </p:spPr>
+        <p:style>
+          <a:lnRef idx="2">
+            <a:schemeClr val="accent1">
+              <a:shade val="50000"/>
+            </a:schemeClr>
+          </a:lnRef>
+          <a:fillRef idx="1">
+            <a:schemeClr val="accent1"/>
+          </a:fillRef>
+          <a:effectRef idx="0">
+            <a:schemeClr val="accent1"/>
+          </a:effectRef>
+          <a:fontRef idx="minor">
+            <a:schemeClr val="lt1"/>
+          </a:fontRef>
+        </p:style>
+        <p:txBody>
+          <a:bodyPr rtlCol="0" anchor="ctr"/>
+          <a:lstStyle/>
+          <a:p>
+            <a:pPr algn="ctr"/>
+            <a:endParaRPr lang="en-US"/>
+          </a:p>
+        </p:txBody>
+      </p:sp>
+      <p:sp>
+        <p:nvSpPr>
+          <p:cNvPr id="7" name="Down Arrow 62"/>
+          <p:cNvSpPr/>
+          <p:nvPr/>
+        </p:nvSpPr>
+        <p:spPr>
+          <a:xfrm rot="16200000">
+            <a:off x="4343400" y="2440910"/>
+            <a:ext cx="685800" cy="1295400"/>
+          </a:xfrm>
+          <a:prstGeom prst="downArrow">
+            <a:avLst/>
+          </a:prstGeom>
+          <a:solidFill>
+            <a:srgbClr val="A34742"/>
+          </a:solidFill>
+          <a:ln>
+            <a:noFill/>
+          </a:ln>
+        </p:spPr>
+        <p:style>
+          <a:lnRef idx="2">
+            <a:schemeClr val="accent1">
+              <a:shade val="50000"/>
+            </a:schemeClr>
+          </a:lnRef>
+          <a:fillRef idx="1">
+            <a:schemeClr val="accent1"/>
+          </a:fillRef>
+          <a:effectRef idx="0">
+            <a:schemeClr val="accent1"/>
+          </a:effectRef>
+          <a:fontRef idx="minor">
+            <a:schemeClr val="lt1"/>
+          </a:fontRef>
+        </p:style>
+        <p:txBody>
+          <a:bodyPr rtlCol="0" anchor="ctr"/>
+          <a:lstStyle/>
+          <a:p>
+            <a:pPr algn="ctr"/>
+            <a:endParaRPr lang="en-US"/>
+          </a:p>
+        </p:txBody>
+      </p:sp>
+      <p:sp>
+        <p:nvSpPr>
+          <p:cNvPr id="8" name="Oval 7"/>
+          <p:cNvSpPr/>
+          <p:nvPr/>
+        </p:nvSpPr>
+        <p:spPr>
+          <a:xfrm>
+            <a:off x="6690834" y="2740246"/>
+            <a:ext cx="1185333" cy="1185333"/>
+          </a:xfrm>
+          <a:prstGeom prst="ellipse">
+            <a:avLst/>
+          </a:prstGeom>
+        </p:spPr>
+        <p:style>
+          <a:lnRef idx="2">
+            <a:schemeClr val="accent1">
+              <a:shade val="50000"/>
+            </a:schemeClr>
+          </a:lnRef>
+          <a:fillRef idx="1">
+            <a:schemeClr val="accent1"/>
+          </a:fillRef>
+          <a:effectRef idx="0">
+            <a:schemeClr val="accent1"/>
+          </a:effectRef>
+          <a:fontRef idx="minor">
+            <a:schemeClr val="lt1"/>
+          </a:fontRef>
+        </p:style>
+        <p:txBody>
+          <a:bodyPr rtlCol="0" anchor="ctr"/>
+          <a:lstStyle/>
+          <a:p>
+            <a:pPr algn="ctr"/>
+            <a:endParaRPr lang="en-US"/>
+          </a:p>
+        </p:txBody>
+      </p:sp>
+      <p:sp>
+        <p:nvSpPr>
+          <p:cNvPr id="9" name="Right Arrow 8"/>
+          <p:cNvSpPr/>
+          <p:nvPr/>
+        </p:nvSpPr>
+        <p:spPr>
+          <a:xfrm rot="16200000">
+            <a:off x="6839000" y="2030325"/>
+            <a:ext cx="889000" cy="444500"/>
+          </a:xfrm>
+          <a:prstGeom prst="rightArrow">
+            <a:avLst/>
+          </a:prstGeom>
+        </p:spPr>
+        <p:style>
+          <a:lnRef idx="2">
+            <a:schemeClr val="accent1">
+              <a:shade val="50000"/>
+            </a:schemeClr>
+          </a:lnRef>
+          <a:fillRef idx="1">
+            <a:schemeClr val="accent1"/>
+          </a:fillRef>
+          <a:effectRef idx="0">
+            <a:schemeClr val="accent1"/>
+          </a:effectRef>
+          <a:fontRef idx="minor">
+            <a:schemeClr val="lt1"/>
+          </a:fontRef>
+        </p:style>
+        <p:txBody>
+          <a:bodyPr rtlCol="0" anchor="ctr"/>
+          <a:lstStyle/>
+          <a:p>
+            <a:pPr algn="ctr"/>
+            <a:endParaRPr lang="en-US"/>
+          </a:p>
+        </p:txBody>
+      </p:sp>
+      <p:sp>
+        <p:nvSpPr>
+          <p:cNvPr id="10" name="Right Arrow 9"/>
+          <p:cNvSpPr/>
+          <p:nvPr/>
+        </p:nvSpPr>
+        <p:spPr>
+          <a:xfrm>
+            <a:off x="8115401" y="3209260"/>
+            <a:ext cx="889000" cy="444500"/>
+          </a:xfrm>
+          <a:prstGeom prst="rightArrow">
+            <a:avLst/>
+          </a:prstGeom>
+        </p:spPr>
+        <p:style>
+          <a:lnRef idx="2">
+            <a:schemeClr val="accent1">
+              <a:shade val="50000"/>
+            </a:schemeClr>
+          </a:lnRef>
+          <a:fillRef idx="1">
+            <a:schemeClr val="accent1"/>
+          </a:fillRef>
+          <a:effectRef idx="0">
+            <a:schemeClr val="accent1"/>
+          </a:effectRef>
+          <a:fontRef idx="minor">
+            <a:schemeClr val="lt1"/>
+          </a:fontRef>
+        </p:style>
+        <p:txBody>
+          <a:bodyPr rtlCol="0" anchor="ctr"/>
+          <a:lstStyle/>
+          <a:p>
+            <a:pPr algn="ctr"/>
+            <a:endParaRPr lang="en-US"/>
+          </a:p>
+        </p:txBody>
+      </p:sp>
+      <p:sp>
+        <p:nvSpPr>
+          <p:cNvPr id="11" name="Right Arrow 10"/>
+          <p:cNvSpPr/>
+          <p:nvPr/>
+        </p:nvSpPr>
+        <p:spPr>
+          <a:xfrm rot="5400000">
+            <a:off x="6839000" y="4191000"/>
+            <a:ext cx="889000" cy="444500"/>
+          </a:xfrm>
+          <a:prstGeom prst="rightArrow">
+            <a:avLst/>
+          </a:prstGeom>
+        </p:spPr>
+        <p:style>
+          <a:lnRef idx="2">
+            <a:schemeClr val="accent1">
+              <a:shade val="50000"/>
+            </a:schemeClr>
+          </a:lnRef>
+          <a:fillRef idx="1">
+            <a:schemeClr val="accent1"/>
+          </a:fillRef>
+          <a:effectRef idx="0">
+            <a:schemeClr val="accent1"/>
+          </a:effectRef>
+          <a:fontRef idx="minor">
+            <a:schemeClr val="lt1"/>
+          </a:fontRef>
+        </p:style>
+        <p:txBody>
+          <a:bodyPr rtlCol="0" anchor="ctr"/>
+          <a:lstStyle/>
+          <a:p>
+            <a:pPr algn="ctr"/>
+            <a:endParaRPr lang="en-US"/>
+          </a:p>
+        </p:txBody>
+      </p:sp>
+      <p:sp>
+        <p:nvSpPr>
+          <p:cNvPr id="12" name="Right Arrow 11"/>
+          <p:cNvSpPr/>
+          <p:nvPr/>
+        </p:nvSpPr>
+        <p:spPr>
+          <a:xfrm rot="10800000">
+            <a:off x="5562600" y="3209260"/>
+            <a:ext cx="889000" cy="444500"/>
+          </a:xfrm>
+          <a:prstGeom prst="rightArrow">
+            <a:avLst/>
+          </a:prstGeom>
+        </p:spPr>
+        <p:style>
+          <a:lnRef idx="2">
+            <a:schemeClr val="accent1">
+              <a:shade val="50000"/>
+            </a:schemeClr>
+          </a:lnRef>
+          <a:fillRef idx="1">
+            <a:schemeClr val="accent1"/>
+          </a:fillRef>
+          <a:effectRef idx="0">
+            <a:schemeClr val="accent1"/>
+          </a:effectRef>
+          <a:fontRef idx="minor">
+            <a:schemeClr val="lt1"/>
+          </a:fontRef>
+        </p:style>
+        <p:txBody>
+          <a:bodyPr rtlCol="0" anchor="ctr"/>
+          <a:lstStyle/>
+          <a:p>
+            <a:pPr algn="ctr"/>
+            <a:endParaRPr lang="en-US"/>
+          </a:p>
+        </p:txBody>
+      </p:sp>
+      <p:pic>
+        <p:nvPicPr>
+          <p:cNvPr id="36" name="Picture 35"/>
+          <p:cNvPicPr>
+            <a:picLocks noChangeAspect="1"/>
+          </p:cNvPicPr>
+          <p:nvPr/>
+        </p:nvPicPr>
+        <p:blipFill rotWithShape="1">
+          <a:blip r:embed="rId2">
+            <a:extLst>
+              <a:ext uri="{28A0092B-C50C-407E-A947-70E740481C1C}">
+                <a14:useLocalDpi xmlns:a14="http://schemas.microsoft.com/office/drawing/2010/main" val="0"/>
+              </a:ext>
+            </a:extLst>
+          </a:blip>
+          <a:srcRect t="4110"/>
+          <a:stretch/>
+        </p:blipFill>
+        <p:spPr>
+          <a:xfrm>
+            <a:off x="4265058" y="3321295"/>
+            <a:ext cx="619125" cy="666750"/>
+          </a:xfrm>
+          <a:prstGeom prst="rect">
+            <a:avLst/>
+          </a:prstGeom>
+        </p:spPr>
+      </p:pic>
+    </p:spTree>
+    <p:extLst>
+      <p:ext uri="{BB962C8B-B14F-4D97-AF65-F5344CB8AC3E}">
+        <p14:creationId xmlns:p14="http://schemas.microsoft.com/office/powerpoint/2010/main" val="2123214923"/>
+      </p:ext>
+    </p:extLst>
+  </p:cSld>
+  <p:clrMapOvr>
+    <a:masterClrMapping/>
+  </p:clrMapOvr>
+</p:sld>
+</file>
+
 <file path=ppt/slides/slide2.xml><?xml version="1.0" encoding="utf-8"?>
 <p:sld xmlns:a="http://schemas.openxmlformats.org/drawingml/2006/main" xmlns:r="http://schemas.openxmlformats.org/officeDocument/2006/relationships" xmlns:p="http://schemas.openxmlformats.org/presentationml/2006/main">
   <p:cSld>
@@ -9002,14 +9938,14 @@
           </a:effectLst>
           <a:extLst>
             <a:ext uri="{909E8E84-426E-40dd-AFC4-6F175D3DCCD1}">
-              <a14:hiddenFill xmlns:a14="http://schemas.microsoft.com/office/drawing/2010/main" xmlns="">
+              <a14:hiddenFill xmlns="" xmlns:a14="http://schemas.microsoft.com/office/drawing/2010/main">
                 <a:solidFill>
                   <a:schemeClr val="accent1"/>
                 </a:solidFill>
               </a14:hiddenFill>
             </a:ext>
             <a:ext uri="{91240B29-F687-4f45-9708-019B960494DF}">
-              <a14:hiddenLine xmlns:a14="http://schemas.microsoft.com/office/drawing/2010/main" xmlns="" w="9525">
+              <a14:hiddenLine xmlns="" xmlns:a14="http://schemas.microsoft.com/office/drawing/2010/main" w="9525">
                 <a:solidFill>
                   <a:schemeClr val="tx1"/>
                 </a:solidFill>
@@ -9060,14 +9996,14 @@
           </a:effectLst>
           <a:extLst>
             <a:ext uri="{909E8E84-426E-40dd-AFC4-6F175D3DCCD1}">
-              <a14:hiddenFill xmlns:a14="http://schemas.microsoft.com/office/drawing/2010/main" xmlns="">
+              <a14:hiddenFill xmlns="" xmlns:a14="http://schemas.microsoft.com/office/drawing/2010/main">
                 <a:solidFill>
                   <a:schemeClr val="accent1"/>
                 </a:solidFill>
               </a14:hiddenFill>
             </a:ext>
             <a:ext uri="{91240B29-F687-4f45-9708-019B960494DF}">
-              <a14:hiddenLine xmlns:a14="http://schemas.microsoft.com/office/drawing/2010/main" xmlns="" w="9525">
+              <a14:hiddenLine xmlns="" xmlns:a14="http://schemas.microsoft.com/office/drawing/2010/main" w="9525">
                 <a:solidFill>
                   <a:schemeClr val="tx1"/>
                 </a:solidFill>
@@ -9118,7 +10054,7 @@
           </a:effectLst>
           <a:extLst>
             <a:ext uri="{909E8E84-426E-40dd-AFC4-6F175D3DCCD1}">
-              <a14:hiddenFill xmlns:a14="http://schemas.microsoft.com/office/drawing/2010/main" xmlns="">
+              <a14:hiddenFill xmlns="" xmlns:a14="http://schemas.microsoft.com/office/drawing/2010/main">
                 <a:solidFill>
                   <a:srgbClr val="FFFFFF"/>
                 </a:solidFill>
@@ -9166,14 +10102,14 @@
           </a:effectLst>
           <a:extLst>
             <a:ext uri="{909E8E84-426E-40dd-AFC4-6F175D3DCCD1}">
-              <a14:hiddenFill xmlns:a14="http://schemas.microsoft.com/office/drawing/2010/main" xmlns="">
+              <a14:hiddenFill xmlns="" xmlns:a14="http://schemas.microsoft.com/office/drawing/2010/main">
                 <a:solidFill>
                   <a:schemeClr val="accent1"/>
                 </a:solidFill>
               </a14:hiddenFill>
             </a:ext>
             <a:ext uri="{91240B29-F687-4f45-9708-019B960494DF}">
-              <a14:hiddenLine xmlns:a14="http://schemas.microsoft.com/office/drawing/2010/main" xmlns="" w="9525">
+              <a14:hiddenLine xmlns="" xmlns:a14="http://schemas.microsoft.com/office/drawing/2010/main" w="9525">
                 <a:solidFill>
                   <a:schemeClr val="tx1"/>
                 </a:solidFill>
@@ -9224,14 +10160,14 @@
           </a:effectLst>
           <a:extLst>
             <a:ext uri="{909E8E84-426E-40dd-AFC4-6F175D3DCCD1}">
-              <a14:hiddenFill xmlns:a14="http://schemas.microsoft.com/office/drawing/2010/main" xmlns="">
+              <a14:hiddenFill xmlns="" xmlns:a14="http://schemas.microsoft.com/office/drawing/2010/main">
                 <a:solidFill>
                   <a:schemeClr val="accent1"/>
                 </a:solidFill>
               </a14:hiddenFill>
             </a:ext>
             <a:ext uri="{91240B29-F687-4f45-9708-019B960494DF}">
-              <a14:hiddenLine xmlns:a14="http://schemas.microsoft.com/office/drawing/2010/main" xmlns="" w="9525">
+              <a14:hiddenLine xmlns="" xmlns:a14="http://schemas.microsoft.com/office/drawing/2010/main" w="9525">
                 <a:solidFill>
                   <a:schemeClr val="tx1"/>
                 </a:solidFill>
@@ -9282,14 +10218,14 @@
           </a:effectLst>
           <a:extLst>
             <a:ext uri="{909E8E84-426E-40dd-AFC4-6F175D3DCCD1}">
-              <a14:hiddenFill xmlns:a14="http://schemas.microsoft.com/office/drawing/2010/main" xmlns="">
+              <a14:hiddenFill xmlns="" xmlns:a14="http://schemas.microsoft.com/office/drawing/2010/main">
                 <a:solidFill>
                   <a:schemeClr val="accent1"/>
                 </a:solidFill>
               </a14:hiddenFill>
             </a:ext>
             <a:ext uri="{91240B29-F687-4f45-9708-019B960494DF}">
-              <a14:hiddenLine xmlns:a14="http://schemas.microsoft.com/office/drawing/2010/main" xmlns="" w="9525">
+              <a14:hiddenLine xmlns="" xmlns:a14="http://schemas.microsoft.com/office/drawing/2010/main" w="9525">
                 <a:solidFill>
                   <a:schemeClr val="tx1"/>
                 </a:solidFill>
@@ -9340,7 +10276,7 @@
           </a:effectLst>
           <a:extLst>
             <a:ext uri="{909E8E84-426E-40dd-AFC4-6F175D3DCCD1}">
-              <a14:hiddenFill xmlns:a14="http://schemas.microsoft.com/office/drawing/2010/main" xmlns="">
+              <a14:hiddenFill xmlns="" xmlns:a14="http://schemas.microsoft.com/office/drawing/2010/main">
                 <a:solidFill>
                   <a:srgbClr val="FFFFFF"/>
                 </a:solidFill>
@@ -9388,14 +10324,14 @@
           </a:effectLst>
           <a:extLst>
             <a:ext uri="{909E8E84-426E-40dd-AFC4-6F175D3DCCD1}">
-              <a14:hiddenFill xmlns:a14="http://schemas.microsoft.com/office/drawing/2010/main" xmlns="">
+              <a14:hiddenFill xmlns="" xmlns:a14="http://schemas.microsoft.com/office/drawing/2010/main">
                 <a:solidFill>
                   <a:schemeClr val="accent1"/>
                 </a:solidFill>
               </a14:hiddenFill>
             </a:ext>
             <a:ext uri="{91240B29-F687-4f45-9708-019B960494DF}">
-              <a14:hiddenLine xmlns:a14="http://schemas.microsoft.com/office/drawing/2010/main" xmlns="" w="9525">
+              <a14:hiddenLine xmlns="" xmlns:a14="http://schemas.microsoft.com/office/drawing/2010/main" w="9525">
                 <a:solidFill>
                   <a:schemeClr val="tx1"/>
                 </a:solidFill>
@@ -9524,7 +10460,7 @@
           </a:effectLst>
           <a:extLst>
             <a:ext uri="{909E8E84-426E-40dd-AFC4-6F175D3DCCD1}">
-              <a14:hiddenFill xmlns:a14="http://schemas.microsoft.com/office/drawing/2010/main" xmlns="">
+              <a14:hiddenFill xmlns="" xmlns:a14="http://schemas.microsoft.com/office/drawing/2010/main">
                 <a:solidFill>
                   <a:srgbClr val="FFFFFF"/>
                 </a:solidFill>
@@ -9602,14 +10538,14 @@
           </a:effectLst>
           <a:extLst>
             <a:ext uri="{909E8E84-426E-40dd-AFC4-6F175D3DCCD1}">
-              <a14:hiddenFill xmlns:a14="http://schemas.microsoft.com/office/drawing/2010/main" xmlns="">
+              <a14:hiddenFill xmlns="" xmlns:a14="http://schemas.microsoft.com/office/drawing/2010/main">
                 <a:solidFill>
                   <a:schemeClr val="accent1"/>
                 </a:solidFill>
               </a14:hiddenFill>
             </a:ext>
             <a:ext uri="{91240B29-F687-4f45-9708-019B960494DF}">
-              <a14:hiddenLine xmlns:a14="http://schemas.microsoft.com/office/drawing/2010/main" xmlns="" w="9525">
+              <a14:hiddenLine xmlns="" xmlns:a14="http://schemas.microsoft.com/office/drawing/2010/main" w="9525">
                 <a:solidFill>
                   <a:schemeClr val="tx1"/>
                 </a:solidFill>
@@ -9660,14 +10596,14 @@
           </a:effectLst>
           <a:extLst>
             <a:ext uri="{909E8E84-426E-40dd-AFC4-6F175D3DCCD1}">
-              <a14:hiddenFill xmlns:a14="http://schemas.microsoft.com/office/drawing/2010/main" xmlns="">
+              <a14:hiddenFill xmlns="" xmlns:a14="http://schemas.microsoft.com/office/drawing/2010/main">
                 <a:solidFill>
                   <a:schemeClr val="accent1"/>
                 </a:solidFill>
               </a14:hiddenFill>
             </a:ext>
             <a:ext uri="{91240B29-F687-4f45-9708-019B960494DF}">
-              <a14:hiddenLine xmlns:a14="http://schemas.microsoft.com/office/drawing/2010/main" xmlns="" w="9525">
+              <a14:hiddenLine xmlns="" xmlns:a14="http://schemas.microsoft.com/office/drawing/2010/main" w="9525">
                 <a:solidFill>
                   <a:schemeClr val="tx1"/>
                 </a:solidFill>
@@ -9718,14 +10654,14 @@
           </a:effectLst>
           <a:extLst>
             <a:ext uri="{909E8E84-426E-40dd-AFC4-6F175D3DCCD1}">
-              <a14:hiddenFill xmlns:a14="http://schemas.microsoft.com/office/drawing/2010/main" xmlns="">
+              <a14:hiddenFill xmlns="" xmlns:a14="http://schemas.microsoft.com/office/drawing/2010/main">
                 <a:solidFill>
                   <a:schemeClr val="accent1"/>
                 </a:solidFill>
               </a14:hiddenFill>
             </a:ext>
             <a:ext uri="{91240B29-F687-4f45-9708-019B960494DF}">
-              <a14:hiddenLine xmlns:a14="http://schemas.microsoft.com/office/drawing/2010/main" xmlns="" w="9525">
+              <a14:hiddenLine xmlns="" xmlns:a14="http://schemas.microsoft.com/office/drawing/2010/main" w="9525">
                 <a:solidFill>
                   <a:schemeClr val="tx1"/>
                 </a:solidFill>
@@ -9776,14 +10712,14 @@
           </a:effectLst>
           <a:extLst>
             <a:ext uri="{909E8E84-426E-40dd-AFC4-6F175D3DCCD1}">
-              <a14:hiddenFill xmlns:a14="http://schemas.microsoft.com/office/drawing/2010/main" xmlns="">
+              <a14:hiddenFill xmlns="" xmlns:a14="http://schemas.microsoft.com/office/drawing/2010/main">
                 <a:solidFill>
                   <a:schemeClr val="accent1"/>
                 </a:solidFill>
               </a14:hiddenFill>
             </a:ext>
             <a:ext uri="{91240B29-F687-4f45-9708-019B960494DF}">
-              <a14:hiddenLine xmlns:a14="http://schemas.microsoft.com/office/drawing/2010/main" xmlns="" w="9525">
+              <a14:hiddenLine xmlns="" xmlns:a14="http://schemas.microsoft.com/office/drawing/2010/main" w="9525">
                 <a:solidFill>
                   <a:schemeClr val="tx1"/>
                 </a:solidFill>
@@ -9834,14 +10770,14 @@
           </a:effectLst>
           <a:extLst>
             <a:ext uri="{909E8E84-426E-40dd-AFC4-6F175D3DCCD1}">
-              <a14:hiddenFill xmlns:a14="http://schemas.microsoft.com/office/drawing/2010/main" xmlns="">
+              <a14:hiddenFill xmlns="" xmlns:a14="http://schemas.microsoft.com/office/drawing/2010/main">
                 <a:solidFill>
                   <a:schemeClr val="accent1"/>
                 </a:solidFill>
               </a14:hiddenFill>
             </a:ext>
             <a:ext uri="{91240B29-F687-4f45-9708-019B960494DF}">
-              <a14:hiddenLine xmlns:a14="http://schemas.microsoft.com/office/drawing/2010/main" xmlns="" w="9525">
+              <a14:hiddenLine xmlns="" xmlns:a14="http://schemas.microsoft.com/office/drawing/2010/main" w="9525">
                 <a:solidFill>
                   <a:schemeClr val="tx1"/>
                 </a:solidFill>
@@ -9892,7 +10828,7 @@
           </a:effectLst>
           <a:extLst>
             <a:ext uri="{909E8E84-426E-40dd-AFC4-6F175D3DCCD1}">
-              <a14:hiddenFill xmlns:a14="http://schemas.microsoft.com/office/drawing/2010/main" xmlns="">
+              <a14:hiddenFill xmlns="" xmlns:a14="http://schemas.microsoft.com/office/drawing/2010/main">
                 <a:solidFill>
                   <a:srgbClr val="FFFFFF"/>
                 </a:solidFill>
@@ -9940,14 +10876,14 @@
           </a:effectLst>
           <a:extLst>
             <a:ext uri="{909E8E84-426E-40dd-AFC4-6F175D3DCCD1}">
-              <a14:hiddenFill xmlns:a14="http://schemas.microsoft.com/office/drawing/2010/main" xmlns="">
+              <a14:hiddenFill xmlns="" xmlns:a14="http://schemas.microsoft.com/office/drawing/2010/main">
                 <a:solidFill>
                   <a:schemeClr val="accent1"/>
                 </a:solidFill>
               </a14:hiddenFill>
             </a:ext>
             <a:ext uri="{91240B29-F687-4f45-9708-019B960494DF}">
-              <a14:hiddenLine xmlns:a14="http://schemas.microsoft.com/office/drawing/2010/main" xmlns="" w="9525">
+              <a14:hiddenLine xmlns="" xmlns:a14="http://schemas.microsoft.com/office/drawing/2010/main" w="9525">
                 <a:solidFill>
                   <a:schemeClr val="tx1"/>
                 </a:solidFill>

</xml_diff>